<commit_message>
Small changes to Course1.pptx
</commit_message>
<xml_diff>
--- a/ClassSlides/Course1.pptx
+++ b/ClassSlides/Course1.pptx
@@ -3829,8 +3829,8 @@
           </a:p>
         </p:txBody>
       </p:sp>
-      <mc:AlternateContent xmlns:mc="http://schemas.openxmlformats.org/markup-compatibility/2006">
-        <mc:Choice xmlns:a14="http://schemas.microsoft.com/office/drawing/2010/main" Requires="a14">
+      <mc:AlternateContent xmlns:mc="http://schemas.openxmlformats.org/markup-compatibility/2006" xmlns:a14="http://schemas.microsoft.com/office/drawing/2010/main">
+        <mc:Choice Requires="a14">
           <p:sp>
             <p:nvSpPr>
               <p:cNvPr id="3" name="Content Placeholder 2">
@@ -4310,7 +4310,7 @@
             </p:txBody>
           </p:sp>
         </mc:Choice>
-        <mc:Fallback>
+        <mc:Fallback xmlns="">
           <p:sp>
             <p:nvSpPr>
               <p:cNvPr id="3" name="Content Placeholder 2">
@@ -6811,19 +6811,27 @@
         </p:spPr>
         <p:txBody>
           <a:bodyPr>
-            <a:normAutofit fontScale="85000" lnSpcReduction="20000"/>
+            <a:normAutofit fontScale="70000" lnSpcReduction="20000"/>
           </a:bodyPr>
           <a:lstStyle/>
           <a:p>
             <a:r>
               <a:rPr lang="en-US" dirty="0"/>
-              <a:t>GAMS: </a:t>
+              <a:t>Course </a:t>
+            </a:r>
+            <a:r>
+              <a:rPr lang="en-US" dirty="0" err="1"/>
+              <a:t>github</a:t>
+            </a:r>
+            <a:r>
+              <a:rPr lang="en-US" dirty="0"/>
+              <a:t> repo: </a:t>
             </a:r>
             <a:r>
               <a:rPr lang="en-US" dirty="0">
                 <a:hlinkClick r:id="rId2"/>
               </a:rPr>
-              <a:t>https://www.gams.com/download/</a:t>
+              <a:t>https://github.com/maxxb77/EBGN632_2019.git</a:t>
             </a:r>
             <a:endParaRPr lang="en-US" dirty="0"/>
           </a:p>
@@ -6833,51 +6841,70 @@
           <a:p>
             <a:r>
               <a:rPr lang="en-US" dirty="0"/>
-              <a:t>R</a:t>
-            </a:r>
-          </a:p>
-          <a:p>
-            <a:pPr lvl="1"/>
-            <a:r>
-              <a:rPr lang="en-US" dirty="0"/>
-              <a:t>R: </a:t>
+              <a:t>GAMS: </a:t>
             </a:r>
             <a:r>
               <a:rPr lang="en-US" dirty="0">
                 <a:hlinkClick r:id="rId3"/>
               </a:rPr>
-              <a:t>https://cran.r-project.org/mirrors.html</a:t>
+              <a:t>https://www.gams.com/download/</a:t>
             </a:r>
             <a:endParaRPr lang="en-US" dirty="0"/>
           </a:p>
           <a:p>
+            <a:endParaRPr lang="en-US" dirty="0"/>
+          </a:p>
+          <a:p>
+            <a:r>
+              <a:rPr lang="en-US" dirty="0"/>
+              <a:t>R</a:t>
+            </a:r>
+          </a:p>
+          <a:p>
             <a:pPr lvl="1"/>
             <a:r>
               <a:rPr lang="en-US" dirty="0"/>
-              <a:t>Rstudio: </a:t>
+              <a:t>R: </a:t>
             </a:r>
             <a:r>
               <a:rPr lang="en-US" dirty="0">
                 <a:hlinkClick r:id="rId4"/>
               </a:rPr>
-              <a:t>https://www.rstudio.com/products/rstudio/download/</a:t>
-            </a:r>
-            <a:endParaRPr lang="en-US" dirty="0"/>
-          </a:p>
-          <a:p>
-            <a:endParaRPr lang="en-US" dirty="0"/>
-          </a:p>
-          <a:p>
-            <a:r>
-              <a:rPr lang="en-US" dirty="0"/>
-              <a:t>Python/Anaconda</a:t>
+              <a:t>https://cran.r-project.org/mirrors.html</a:t>
+            </a:r>
+            <a:r>
+              <a:rPr lang="en-US" dirty="0"/>
+              <a:t> &lt;- install base R before installing RStudio</a:t>
             </a:r>
           </a:p>
           <a:p>
             <a:pPr lvl="1"/>
+            <a:r>
+              <a:rPr lang="en-US" dirty="0"/>
+              <a:t>RStudio: </a:t>
+            </a:r>
             <a:r>
               <a:rPr lang="en-US" dirty="0">
                 <a:hlinkClick r:id="rId5"/>
+              </a:rPr>
+              <a:t>https://www.rstudio.com/products/rstudio/download/</a:t>
+            </a:r>
+            <a:endParaRPr lang="en-US" dirty="0"/>
+          </a:p>
+          <a:p>
+            <a:endParaRPr lang="en-US" dirty="0"/>
+          </a:p>
+          <a:p>
+            <a:r>
+              <a:rPr lang="en-US" dirty="0"/>
+              <a:t>Python/Anaconda</a:t>
+            </a:r>
+          </a:p>
+          <a:p>
+            <a:pPr lvl="1"/>
+            <a:r>
+              <a:rPr lang="en-US" dirty="0">
+                <a:hlinkClick r:id="rId6"/>
               </a:rPr>
               <a:t>https://www.anaconda.com/distribution/#download-section</a:t>
             </a:r>
@@ -6925,7 +6952,7 @@
             </a:r>
             <a:r>
               <a:rPr lang="en-US" dirty="0">
-                <a:hlinkClick r:id="rId6"/>
+                <a:hlinkClick r:id="rId7"/>
               </a:rPr>
               <a:t>https://www.sublimetext.com/3</a:t>
             </a:r>
@@ -6936,26 +6963,12 @@
             <a:r>
               <a:rPr lang="en-US" dirty="0"/>
               <a:t>Install GAMS package: </a:t>
-            </a:r>
-            <a:r>
-              <a:rPr lang="en-US" dirty="0">
-                <a:hlinkClick r:id="rId7"/>
-              </a:rPr>
-              <a:t>https://github.com/lolow/sublime-gams</a:t>
-            </a:r>
-            <a:endParaRPr lang="en-US" dirty="0"/>
-          </a:p>
-          <a:p>
-            <a:pPr lvl="1"/>
-            <a:r>
-              <a:rPr lang="en-US" dirty="0"/>
-              <a:t>Atom: </a:t>
             </a:r>
             <a:r>
               <a:rPr lang="en-US" dirty="0">
                 <a:hlinkClick r:id="rId8"/>
               </a:rPr>
-              <a:t>https://ide.atom.io/</a:t>
+              <a:t>https://github.com/lolow/sublime-gams</a:t>
             </a:r>
             <a:endParaRPr lang="en-US" dirty="0"/>
           </a:p>
@@ -6963,11 +6976,25 @@
             <a:pPr lvl="1"/>
             <a:r>
               <a:rPr lang="en-US" dirty="0"/>
-              <a:t>Notepad++ : </a:t>
+              <a:t>Atom: </a:t>
             </a:r>
             <a:r>
               <a:rPr lang="en-US" dirty="0">
                 <a:hlinkClick r:id="rId9"/>
+              </a:rPr>
+              <a:t>https://ide.atom.io/</a:t>
+            </a:r>
+            <a:endParaRPr lang="en-US" dirty="0"/>
+          </a:p>
+          <a:p>
+            <a:pPr lvl="1"/>
+            <a:r>
+              <a:rPr lang="en-US" dirty="0"/>
+              <a:t>Notepad++ : </a:t>
+            </a:r>
+            <a:r>
+              <a:rPr lang="en-US" dirty="0">
+                <a:hlinkClick r:id="rId10"/>
               </a:rPr>
               <a:t>https://notepad-plus-plus.org/</a:t>
             </a:r>
@@ -8348,7 +8375,7 @@
           <a:p>
             <a:r>
               <a:rPr lang="en-US" dirty="0"/>
-              <a:t>Running the TRNSPRT model…</a:t>
+              <a:t>Running the TRNSPORT model…</a:t>
             </a:r>
           </a:p>
         </p:txBody>

</xml_diff>

<commit_message>
First edition of Course2.pptx
Small changes to Course1.pptx

Adding workshop.gms to code\course2 directory
</commit_message>
<xml_diff>
--- a/ClassSlides/Course1.pptx
+++ b/ClassSlides/Course1.pptx
@@ -275,7 +275,7 @@
           <a:p>
             <a:fld id="{A3732A28-F81A-489F-964A-49246DF7D1F7}" type="datetimeFigureOut">
               <a:rPr lang="en-US" smtClean="0"/>
-              <a:t>8/25/2019</a:t>
+              <a:t>8/26/2019</a:t>
             </a:fld>
             <a:endParaRPr lang="en-US"/>
           </a:p>
@@ -473,7 +473,7 @@
           <a:p>
             <a:fld id="{A3732A28-F81A-489F-964A-49246DF7D1F7}" type="datetimeFigureOut">
               <a:rPr lang="en-US" smtClean="0"/>
-              <a:t>8/25/2019</a:t>
+              <a:t>8/26/2019</a:t>
             </a:fld>
             <a:endParaRPr lang="en-US"/>
           </a:p>
@@ -681,7 +681,7 @@
           <a:p>
             <a:fld id="{A3732A28-F81A-489F-964A-49246DF7D1F7}" type="datetimeFigureOut">
               <a:rPr lang="en-US" smtClean="0"/>
-              <a:t>8/25/2019</a:t>
+              <a:t>8/26/2019</a:t>
             </a:fld>
             <a:endParaRPr lang="en-US"/>
           </a:p>
@@ -879,7 +879,7 @@
           <a:p>
             <a:fld id="{A3732A28-F81A-489F-964A-49246DF7D1F7}" type="datetimeFigureOut">
               <a:rPr lang="en-US" smtClean="0"/>
-              <a:t>8/25/2019</a:t>
+              <a:t>8/26/2019</a:t>
             </a:fld>
             <a:endParaRPr lang="en-US"/>
           </a:p>
@@ -1154,7 +1154,7 @@
           <a:p>
             <a:fld id="{A3732A28-F81A-489F-964A-49246DF7D1F7}" type="datetimeFigureOut">
               <a:rPr lang="en-US" smtClean="0"/>
-              <a:t>8/25/2019</a:t>
+              <a:t>8/26/2019</a:t>
             </a:fld>
             <a:endParaRPr lang="en-US"/>
           </a:p>
@@ -1419,7 +1419,7 @@
           <a:p>
             <a:fld id="{A3732A28-F81A-489F-964A-49246DF7D1F7}" type="datetimeFigureOut">
               <a:rPr lang="en-US" smtClean="0"/>
-              <a:t>8/25/2019</a:t>
+              <a:t>8/26/2019</a:t>
             </a:fld>
             <a:endParaRPr lang="en-US"/>
           </a:p>
@@ -1831,7 +1831,7 @@
           <a:p>
             <a:fld id="{A3732A28-F81A-489F-964A-49246DF7D1F7}" type="datetimeFigureOut">
               <a:rPr lang="en-US" smtClean="0"/>
-              <a:t>8/25/2019</a:t>
+              <a:t>8/26/2019</a:t>
             </a:fld>
             <a:endParaRPr lang="en-US"/>
           </a:p>
@@ -1972,7 +1972,7 @@
           <a:p>
             <a:fld id="{A3732A28-F81A-489F-964A-49246DF7D1F7}" type="datetimeFigureOut">
               <a:rPr lang="en-US" smtClean="0"/>
-              <a:t>8/25/2019</a:t>
+              <a:t>8/26/2019</a:t>
             </a:fld>
             <a:endParaRPr lang="en-US"/>
           </a:p>
@@ -2085,7 +2085,7 @@
           <a:p>
             <a:fld id="{A3732A28-F81A-489F-964A-49246DF7D1F7}" type="datetimeFigureOut">
               <a:rPr lang="en-US" smtClean="0"/>
-              <a:t>8/25/2019</a:t>
+              <a:t>8/26/2019</a:t>
             </a:fld>
             <a:endParaRPr lang="en-US"/>
           </a:p>
@@ -2396,7 +2396,7 @@
           <a:p>
             <a:fld id="{A3732A28-F81A-489F-964A-49246DF7D1F7}" type="datetimeFigureOut">
               <a:rPr lang="en-US" smtClean="0"/>
-              <a:t>8/25/2019</a:t>
+              <a:t>8/26/2019</a:t>
             </a:fld>
             <a:endParaRPr lang="en-US"/>
           </a:p>
@@ -2684,7 +2684,7 @@
           <a:p>
             <a:fld id="{A3732A28-F81A-489F-964A-49246DF7D1F7}" type="datetimeFigureOut">
               <a:rPr lang="en-US" smtClean="0"/>
-              <a:t>8/25/2019</a:t>
+              <a:t>8/26/2019</a:t>
             </a:fld>
             <a:endParaRPr lang="en-US"/>
           </a:p>
@@ -2925,7 +2925,7 @@
           <a:p>
             <a:fld id="{A3732A28-F81A-489F-964A-49246DF7D1F7}" type="datetimeFigureOut">
               <a:rPr lang="en-US" smtClean="0"/>
-              <a:t>8/25/2019</a:t>
+              <a:t>8/26/2019</a:t>
             </a:fld>
             <a:endParaRPr lang="en-US"/>
           </a:p>
@@ -6638,7 +6638,7 @@
         </p:spPr>
         <p:txBody>
           <a:bodyPr>
-            <a:normAutofit/>
+            <a:normAutofit fontScale="92500" lnSpcReduction="20000"/>
           </a:bodyPr>
           <a:lstStyle/>
           <a:p>
@@ -6647,8 +6647,50 @@
             </a:pPr>
             <a:r>
               <a:rPr lang="en-US" dirty="0"/>
-              <a:t>Three smaller assignments due 9/6/19</a:t>
-            </a:r>
+              <a:t>Three smaller assignments </a:t>
+            </a:r>
+            <a:r>
+              <a:rPr lang="en-US" b="1" i="1" dirty="0"/>
+              <a:t>due 9/6/19</a:t>
+            </a:r>
+          </a:p>
+          <a:p>
+            <a:pPr marL="0" indent="0">
+              <a:buNone/>
+            </a:pPr>
+            <a:endParaRPr lang="en-US" b="1" i="1" dirty="0"/>
+          </a:p>
+          <a:p>
+            <a:pPr marL="0" indent="0">
+              <a:buNone/>
+            </a:pPr>
+            <a:r>
+              <a:rPr lang="en-US" b="1" i="1" dirty="0"/>
+              <a:t>Send as one email to: </a:t>
+            </a:r>
+            <a:r>
+              <a:rPr lang="en-US" b="1" i="1" dirty="0" err="1">
+                <a:hlinkClick r:id="rId2"/>
+              </a:rPr>
+              <a:t>Maxwell.</a:t>
+            </a:r>
+            <a:r>
+              <a:rPr lang="en-US" b="1" i="1" err="1">
+                <a:hlinkClick r:id="rId2"/>
+              </a:rPr>
+              <a:t>L</a:t>
+            </a:r>
+            <a:r>
+              <a:rPr lang="en-US" b="1" i="1">
+                <a:hlinkClick r:id="rId2"/>
+              </a:rPr>
+              <a:t>.Brown@gmail.com</a:t>
+            </a:r>
+            <a:r>
+              <a:rPr lang="en-US" b="1" i="1"/>
+              <a:t> </a:t>
+            </a:r>
+            <a:endParaRPr lang="en-US" b="1" i="1" dirty="0"/>
           </a:p>
           <a:p>
             <a:pPr marL="0" indent="0">

</xml_diff>